<commit_message>
feat: update course materials
</commit_message>
<xml_diff>
--- a/GENAI_W2.pptx
+++ b/GENAI_W2.pptx
@@ -330,7 +330,7 @@
           <a:p>
             <a:fld id="{0D39C3C5-731D-4B21-ADFE-660A2C634B6C}" type="datetimeFigureOut">
               <a:rPr lang="en-GB" smtClean="0"/>
-              <a:t>07/03/2025</a:t>
+              <a:t>09/03/2025</a:t>
             </a:fld>
             <a:endParaRPr lang="en-GB"/>
           </a:p>
@@ -5390,7 +5390,7 @@
           <a:p>
             <a:fld id="{786F00B2-F792-46CA-9124-502B729CBF46}" type="datetimeFigureOut">
               <a:rPr lang="en-GB" smtClean="0"/>
-              <a:t>07/03/2025</a:t>
+              <a:t>09/03/2025</a:t>
             </a:fld>
             <a:endParaRPr lang="en-GB"/>
           </a:p>
@@ -5590,7 +5590,7 @@
           <a:p>
             <a:fld id="{786F00B2-F792-46CA-9124-502B729CBF46}" type="datetimeFigureOut">
               <a:rPr lang="en-GB" smtClean="0"/>
-              <a:t>07/03/2025</a:t>
+              <a:t>09/03/2025</a:t>
             </a:fld>
             <a:endParaRPr lang="en-GB"/>
           </a:p>
@@ -5800,7 +5800,7 @@
           <a:p>
             <a:fld id="{786F00B2-F792-46CA-9124-502B729CBF46}" type="datetimeFigureOut">
               <a:rPr lang="en-GB" smtClean="0"/>
-              <a:t>07/03/2025</a:t>
+              <a:t>09/03/2025</a:t>
             </a:fld>
             <a:endParaRPr lang="en-GB"/>
           </a:p>
@@ -6000,7 +6000,7 @@
           <a:p>
             <a:fld id="{786F00B2-F792-46CA-9124-502B729CBF46}" type="datetimeFigureOut">
               <a:rPr lang="en-GB" smtClean="0"/>
-              <a:t>07/03/2025</a:t>
+              <a:t>09/03/2025</a:t>
             </a:fld>
             <a:endParaRPr lang="en-GB"/>
           </a:p>
@@ -6276,7 +6276,7 @@
           <a:p>
             <a:fld id="{786F00B2-F792-46CA-9124-502B729CBF46}" type="datetimeFigureOut">
               <a:rPr lang="en-GB" smtClean="0"/>
-              <a:t>07/03/2025</a:t>
+              <a:t>09/03/2025</a:t>
             </a:fld>
             <a:endParaRPr lang="en-GB"/>
           </a:p>
@@ -6544,7 +6544,7 @@
           <a:p>
             <a:fld id="{786F00B2-F792-46CA-9124-502B729CBF46}" type="datetimeFigureOut">
               <a:rPr lang="en-GB" smtClean="0"/>
-              <a:t>07/03/2025</a:t>
+              <a:t>09/03/2025</a:t>
             </a:fld>
             <a:endParaRPr lang="en-GB"/>
           </a:p>
@@ -6959,7 +6959,7 @@
           <a:p>
             <a:fld id="{786F00B2-F792-46CA-9124-502B729CBF46}" type="datetimeFigureOut">
               <a:rPr lang="en-GB" smtClean="0"/>
-              <a:t>07/03/2025</a:t>
+              <a:t>09/03/2025</a:t>
             </a:fld>
             <a:endParaRPr lang="en-GB"/>
           </a:p>
@@ -7101,7 +7101,7 @@
           <a:p>
             <a:fld id="{786F00B2-F792-46CA-9124-502B729CBF46}" type="datetimeFigureOut">
               <a:rPr lang="en-GB" smtClean="0"/>
-              <a:t>07/03/2025</a:t>
+              <a:t>09/03/2025</a:t>
             </a:fld>
             <a:endParaRPr lang="en-GB"/>
           </a:p>
@@ -7214,7 +7214,7 @@
           <a:p>
             <a:fld id="{786F00B2-F792-46CA-9124-502B729CBF46}" type="datetimeFigureOut">
               <a:rPr lang="en-GB" smtClean="0"/>
-              <a:t>07/03/2025</a:t>
+              <a:t>09/03/2025</a:t>
             </a:fld>
             <a:endParaRPr lang="en-GB"/>
           </a:p>
@@ -7527,7 +7527,7 @@
           <a:p>
             <a:fld id="{786F00B2-F792-46CA-9124-502B729CBF46}" type="datetimeFigureOut">
               <a:rPr lang="en-GB" smtClean="0"/>
-              <a:t>07/03/2025</a:t>
+              <a:t>09/03/2025</a:t>
             </a:fld>
             <a:endParaRPr lang="en-GB"/>
           </a:p>
@@ -7816,7 +7816,7 @@
           <a:p>
             <a:fld id="{786F00B2-F792-46CA-9124-502B729CBF46}" type="datetimeFigureOut">
               <a:rPr lang="en-GB" smtClean="0"/>
-              <a:t>07/03/2025</a:t>
+              <a:t>09/03/2025</a:t>
             </a:fld>
             <a:endParaRPr lang="en-GB"/>
           </a:p>
@@ -8059,7 +8059,7 @@
           <a:p>
             <a:fld id="{786F00B2-F792-46CA-9124-502B729CBF46}" type="datetimeFigureOut">
               <a:rPr lang="en-GB" smtClean="0"/>
-              <a:t>07/03/2025</a:t>
+              <a:t>09/03/2025</a:t>
             </a:fld>
             <a:endParaRPr lang="en-GB"/>
           </a:p>
@@ -11464,14 +11464,21 @@
                 <a:latin typeface="Poppins" panose="00000500000000000000" pitchFamily="2" charset="-18"/>
                 <a:cs typeface="Poppins" panose="00000500000000000000" pitchFamily="2" charset="-18"/>
               </a:rPr>
-              <a:t>thouth</a:t>
+              <a:t>thou</a:t>
+            </a:r>
+            <a:r>
+              <a:rPr lang="en-GB" sz="1600" dirty="0">
+                <a:latin typeface="Poppins" panose="00000500000000000000" pitchFamily="2" charset="-18"/>
+                <a:cs typeface="Poppins" panose="00000500000000000000" pitchFamily="2" charset="-18"/>
+              </a:rPr>
+              <a:t>g</a:t>
             </a:r>
             <a:r>
               <a:rPr lang="pl-PL" sz="1600" dirty="0">
                 <a:latin typeface="Poppins" panose="00000500000000000000" pitchFamily="2" charset="-18"/>
                 <a:cs typeface="Poppins" panose="00000500000000000000" pitchFamily="2" charset="-18"/>
               </a:rPr>
-              <a:t> </a:t>
+              <a:t>th </a:t>
             </a:r>
             <a:r>
               <a:rPr lang="pl-PL" sz="1600" dirty="0" err="1">

</xml_diff>